<commit_message>
Views, Add Time in Deal & Stock
</commit_message>
<xml_diff>
--- a/Luminous Sales.pptx
+++ b/Luminous Sales.pptx
@@ -3671,13 +3671,6 @@
               <a:rPr lang="en-US" dirty="0" smtClean="0"/>
               <a:t>, GNU/Linux</a:t>
             </a:r>
-            <a:r>
-              <a:rPr lang="bg-BG" dirty="0" smtClean="0"/>
-              <a:t> ??????????????????</a:t>
-            </a:r>
-            <a:endParaRPr lang="en-US" dirty="0" smtClean="0"/>
-          </a:p>
-          <a:p>
             <a:endParaRPr lang="bg-BG" dirty="0"/>
           </a:p>
         </p:txBody>
@@ -3868,7 +3861,7 @@
           <a:bodyPr/>
           <a:lstStyle/>
           <a:p>
-            <a:endParaRPr lang="bg-BG"/>
+            <a:endParaRPr lang="bg-BG" dirty="0"/>
           </a:p>
         </p:txBody>
       </p:sp>
@@ -3926,6 +3919,50 @@
           </a:extLst>
         </p:spPr>
       </p:pic>
+      <p:sp>
+        <p:nvSpPr>
+          <p:cNvPr id="4" name="Правоъгълник 3"/>
+          <p:cNvSpPr/>
+          <p:nvPr/>
+        </p:nvSpPr>
+        <p:spPr>
+          <a:xfrm>
+            <a:off x="2051720" y="4587974"/>
+            <a:ext cx="5040560" cy="360040"/>
+          </a:xfrm>
+          <a:prstGeom prst="rect">
+            <a:avLst/>
+          </a:prstGeom>
+        </p:spPr>
+        <p:style>
+          <a:lnRef idx="2">
+            <a:schemeClr val="accent1">
+              <a:shade val="50000"/>
+            </a:schemeClr>
+          </a:lnRef>
+          <a:fillRef idx="1">
+            <a:schemeClr val="accent1"/>
+          </a:fillRef>
+          <a:effectRef idx="0">
+            <a:schemeClr val="accent1"/>
+          </a:effectRef>
+          <a:fontRef idx="minor">
+            <a:schemeClr val="lt1"/>
+          </a:fontRef>
+        </p:style>
+        <p:txBody>
+          <a:bodyPr rtlCol="0" anchor="ctr"/>
+          <a:lstStyle/>
+          <a:p>
+            <a:pPr algn="ctr"/>
+            <a:r>
+              <a:rPr lang="en-US" dirty="0" smtClean="0"/>
+              <a:t>www.github.com/CapitalRhino/luminous-sales</a:t>
+            </a:r>
+            <a:endParaRPr lang="bg-BG" dirty="0"/>
+          </a:p>
+        </p:txBody>
+      </p:sp>
     </p:spTree>
     <p:extLst>
       <p:ext uri="{BB962C8B-B14F-4D97-AF65-F5344CB8AC3E}">

</xml_diff>